<commit_message>
Enable API + Update Data + webpage ICON
Enable Related Skills API as follows:
-http://www.skillsense/data/relatedskills/<skill>
</commit_message>
<xml_diff>
--- a/doc/AfterOneSkillOneGroup_removedto50_skill_dist.pptx
+++ b/doc/AfterOneSkillOneGroup_removedto50_skill_dist.pptx
@@ -295,7 +295,7 @@
           <a:p>
             <a:fld id="{68EA736D-B30D-438A-A368-55BF81425F13}" type="datetimeFigureOut">
               <a:rPr lang="en-US" smtClean="0"/>
-              <a:t>1/4/2018</a:t>
+              <a:t>1/5/2018</a:t>
             </a:fld>
             <a:endParaRPr lang="en-US"/>
           </a:p>
@@ -465,7 +465,7 @@
           <a:p>
             <a:fld id="{68EA736D-B30D-438A-A368-55BF81425F13}" type="datetimeFigureOut">
               <a:rPr lang="en-US" smtClean="0"/>
-              <a:t>1/4/2018</a:t>
+              <a:t>1/5/2018</a:t>
             </a:fld>
             <a:endParaRPr lang="en-US"/>
           </a:p>
@@ -645,7 +645,7 @@
           <a:p>
             <a:fld id="{68EA736D-B30D-438A-A368-55BF81425F13}" type="datetimeFigureOut">
               <a:rPr lang="en-US" smtClean="0"/>
-              <a:t>1/4/2018</a:t>
+              <a:t>1/5/2018</a:t>
             </a:fld>
             <a:endParaRPr lang="en-US"/>
           </a:p>
@@ -815,7 +815,7 @@
           <a:p>
             <a:fld id="{68EA736D-B30D-438A-A368-55BF81425F13}" type="datetimeFigureOut">
               <a:rPr lang="en-US" smtClean="0"/>
-              <a:t>1/4/2018</a:t>
+              <a:t>1/5/2018</a:t>
             </a:fld>
             <a:endParaRPr lang="en-US"/>
           </a:p>
@@ -1061,7 +1061,7 @@
           <a:p>
             <a:fld id="{68EA736D-B30D-438A-A368-55BF81425F13}" type="datetimeFigureOut">
               <a:rPr lang="en-US" smtClean="0"/>
-              <a:t>1/4/2018</a:t>
+              <a:t>1/5/2018</a:t>
             </a:fld>
             <a:endParaRPr lang="en-US"/>
           </a:p>
@@ -1293,7 +1293,7 @@
           <a:p>
             <a:fld id="{68EA736D-B30D-438A-A368-55BF81425F13}" type="datetimeFigureOut">
               <a:rPr lang="en-US" smtClean="0"/>
-              <a:t>1/4/2018</a:t>
+              <a:t>1/5/2018</a:t>
             </a:fld>
             <a:endParaRPr lang="en-US"/>
           </a:p>
@@ -1660,7 +1660,7 @@
           <a:p>
             <a:fld id="{68EA736D-B30D-438A-A368-55BF81425F13}" type="datetimeFigureOut">
               <a:rPr lang="en-US" smtClean="0"/>
-              <a:t>1/4/2018</a:t>
+              <a:t>1/5/2018</a:t>
             </a:fld>
             <a:endParaRPr lang="en-US"/>
           </a:p>
@@ -1778,7 +1778,7 @@
           <a:p>
             <a:fld id="{68EA736D-B30D-438A-A368-55BF81425F13}" type="datetimeFigureOut">
               <a:rPr lang="en-US" smtClean="0"/>
-              <a:t>1/4/2018</a:t>
+              <a:t>1/5/2018</a:t>
             </a:fld>
             <a:endParaRPr lang="en-US"/>
           </a:p>
@@ -1873,7 +1873,7 @@
           <a:p>
             <a:fld id="{68EA736D-B30D-438A-A368-55BF81425F13}" type="datetimeFigureOut">
               <a:rPr lang="en-US" smtClean="0"/>
-              <a:t>1/4/2018</a:t>
+              <a:t>1/5/2018</a:t>
             </a:fld>
             <a:endParaRPr lang="en-US"/>
           </a:p>
@@ -2150,7 +2150,7 @@
           <a:p>
             <a:fld id="{68EA736D-B30D-438A-A368-55BF81425F13}" type="datetimeFigureOut">
               <a:rPr lang="en-US" smtClean="0"/>
-              <a:t>1/4/2018</a:t>
+              <a:t>1/5/2018</a:t>
             </a:fld>
             <a:endParaRPr lang="en-US"/>
           </a:p>
@@ -2403,7 +2403,7 @@
           <a:p>
             <a:fld id="{68EA736D-B30D-438A-A368-55BF81425F13}" type="datetimeFigureOut">
               <a:rPr lang="en-US" smtClean="0"/>
-              <a:t>1/4/2018</a:t>
+              <a:t>1/5/2018</a:t>
             </a:fld>
             <a:endParaRPr lang="en-US"/>
           </a:p>
@@ -2616,7 +2616,7 @@
           <a:p>
             <a:fld id="{68EA736D-B30D-438A-A368-55BF81425F13}" type="datetimeFigureOut">
               <a:rPr lang="en-US" smtClean="0"/>
-              <a:t>1/4/2018</a:t>
+              <a:t>1/5/2018</a:t>
             </a:fld>
             <a:endParaRPr lang="en-US"/>
           </a:p>
@@ -27643,6 +27643,703 @@
           </p:spPr>
         </p:pic>
       </p:grpSp>
+      <p:graphicFrame>
+        <p:nvGraphicFramePr>
+          <p:cNvPr id="11" name="Table 10"/>
+          <p:cNvGraphicFramePr>
+            <a:graphicFrameLocks noGrp="1"/>
+          </p:cNvGraphicFramePr>
+          <p:nvPr>
+            <p:extLst>
+              <p:ext uri="{D42A27DB-BD31-4B8C-83A1-F6EECF244321}">
+                <p14:modId xmlns:p14="http://schemas.microsoft.com/office/powerpoint/2010/main" val="2253758214"/>
+              </p:ext>
+            </p:extLst>
+          </p:nvPr>
+        </p:nvGraphicFramePr>
+        <p:xfrm>
+          <a:off x="5180810" y="3172967"/>
+          <a:ext cx="5434810" cy="384810"/>
+        </p:xfrm>
+        <a:graphic>
+          <a:graphicData uri="http://schemas.openxmlformats.org/drawingml/2006/table">
+            <a:tbl>
+              <a:tblPr/>
+              <a:tblGrid>
+                <a:gridCol w="1218637"/>
+                <a:gridCol w="1536473"/>
+                <a:gridCol w="1587500"/>
+                <a:gridCol w="1092200"/>
+              </a:tblGrid>
+              <a:tr h="190500">
+                <a:tc>
+                  <a:txBody>
+                    <a:bodyPr/>
+                    <a:lstStyle/>
+                    <a:p>
+                      <a:pPr algn="ctr" fontAlgn="b"/>
+                      <a:r>
+                        <a:rPr lang="en-US" sz="1200" b="0" i="0" u="none" strike="noStrike" dirty="0" err="1" smtClean="0">
+                          <a:solidFill>
+                            <a:srgbClr val="000000"/>
+                          </a:solidFill>
+                          <a:effectLst/>
+                          <a:latin typeface="Calibri" panose="020F0502020204030204" pitchFamily="34" charset="0"/>
+                        </a:rPr>
+                        <a:t>Num</a:t>
+                      </a:r>
+                      <a:r>
+                        <a:rPr lang="en-US" sz="1200" b="0" i="0" u="none" strike="noStrike" baseline="0" dirty="0" smtClean="0">
+                          <a:solidFill>
+                            <a:srgbClr val="000000"/>
+                          </a:solidFill>
+                          <a:effectLst/>
+                          <a:latin typeface="Calibri" panose="020F0502020204030204" pitchFamily="34" charset="0"/>
+                        </a:rPr>
+                        <a:t> of </a:t>
+                      </a:r>
+                      <a:r>
+                        <a:rPr lang="en-US" sz="1200" b="0" i="0" u="none" strike="noStrike" baseline="0" dirty="0" err="1" smtClean="0">
+                          <a:solidFill>
+                            <a:srgbClr val="000000"/>
+                          </a:solidFill>
+                          <a:effectLst/>
+                          <a:latin typeface="Calibri" panose="020F0502020204030204" pitchFamily="34" charset="0"/>
+                        </a:rPr>
+                        <a:t>j</a:t>
+                      </a:r>
+                      <a:r>
+                        <a:rPr lang="en-US" sz="1200" b="0" i="0" u="none" strike="noStrike" dirty="0" err="1" smtClean="0">
+                          <a:solidFill>
+                            <a:srgbClr val="000000"/>
+                          </a:solidFill>
+                          <a:effectLst/>
+                          <a:latin typeface="Calibri" panose="020F0502020204030204" pitchFamily="34" charset="0"/>
+                        </a:rPr>
+                        <a:t>ob_post</a:t>
+                      </a:r>
+                      <a:endParaRPr lang="en-US" sz="1200" b="0" i="0" u="none" strike="noStrike" dirty="0">
+                        <a:solidFill>
+                          <a:srgbClr val="000000"/>
+                        </a:solidFill>
+                        <a:effectLst/>
+                        <a:latin typeface="Calibri" panose="020F0502020204030204" pitchFamily="34" charset="0"/>
+                      </a:endParaRPr>
+                    </a:p>
+                  </a:txBody>
+                  <a:tcPr marL="9525" marR="9525" marT="9525" marB="0" anchor="b">
+                    <a:lnL w="12700" cap="flat" cmpd="sng" algn="ctr">
+                      <a:solidFill>
+                        <a:schemeClr val="tx1"/>
+                      </a:solidFill>
+                      <a:prstDash val="solid"/>
+                      <a:round/>
+                      <a:headEnd type="none" w="med" len="med"/>
+                      <a:tailEnd type="none" w="med" len="med"/>
+                    </a:lnL>
+                    <a:lnR w="12700" cap="flat" cmpd="sng" algn="ctr">
+                      <a:solidFill>
+                        <a:schemeClr val="tx1"/>
+                      </a:solidFill>
+                      <a:prstDash val="solid"/>
+                      <a:round/>
+                      <a:headEnd type="none" w="med" len="med"/>
+                      <a:tailEnd type="none" w="med" len="med"/>
+                    </a:lnR>
+                    <a:lnT w="12700" cap="flat" cmpd="sng" algn="ctr">
+                      <a:solidFill>
+                        <a:schemeClr val="tx1"/>
+                      </a:solidFill>
+                      <a:prstDash val="solid"/>
+                      <a:round/>
+                      <a:headEnd type="none" w="med" len="med"/>
+                      <a:tailEnd type="none" w="med" len="med"/>
+                    </a:lnT>
+                    <a:lnB w="12700" cap="flat" cmpd="sng" algn="ctr">
+                      <a:solidFill>
+                        <a:schemeClr val="tx1"/>
+                      </a:solidFill>
+                      <a:prstDash val="solid"/>
+                      <a:round/>
+                      <a:headEnd type="none" w="med" len="med"/>
+                      <a:tailEnd type="none" w="med" len="med"/>
+                    </a:lnB>
+                    <a:lnTlToBr w="12700" cmpd="sng">
+                      <a:noFill/>
+                      <a:prstDash val="solid"/>
+                    </a:lnTlToBr>
+                    <a:lnBlToTr w="12700" cmpd="sng">
+                      <a:noFill/>
+                      <a:prstDash val="solid"/>
+                    </a:lnBlToTr>
+                    <a:solidFill>
+                      <a:schemeClr val="bg1">
+                        <a:lumMod val="85000"/>
+                      </a:schemeClr>
+                    </a:solidFill>
+                  </a:tcPr>
+                </a:tc>
+                <a:tc>
+                  <a:txBody>
+                    <a:bodyPr/>
+                    <a:lstStyle/>
+                    <a:p>
+                      <a:pPr algn="ctr" fontAlgn="b"/>
+                      <a:r>
+                        <a:rPr lang="en-US" sz="1200" b="0" i="0" u="none" strike="noStrike" dirty="0" smtClean="0">
+                          <a:solidFill>
+                            <a:srgbClr val="000000"/>
+                          </a:solidFill>
+                          <a:effectLst/>
+                          <a:latin typeface="Calibri" panose="020F0502020204030204" pitchFamily="34" charset="0"/>
+                        </a:rPr>
+                        <a:t>Skill</a:t>
+                      </a:r>
+                      <a:endParaRPr lang="en-US" sz="1200" b="0" i="0" u="none" strike="noStrike" dirty="0">
+                        <a:solidFill>
+                          <a:srgbClr val="000000"/>
+                        </a:solidFill>
+                        <a:effectLst/>
+                        <a:latin typeface="Calibri" panose="020F0502020204030204" pitchFamily="34" charset="0"/>
+                      </a:endParaRPr>
+                    </a:p>
+                  </a:txBody>
+                  <a:tcPr marL="9525" marR="9525" marT="9525" marB="0" anchor="b">
+                    <a:lnL w="12700" cap="flat" cmpd="sng" algn="ctr">
+                      <a:solidFill>
+                        <a:schemeClr val="tx1"/>
+                      </a:solidFill>
+                      <a:prstDash val="solid"/>
+                      <a:round/>
+                      <a:headEnd type="none" w="med" len="med"/>
+                      <a:tailEnd type="none" w="med" len="med"/>
+                    </a:lnL>
+                    <a:lnR w="12700" cap="flat" cmpd="sng" algn="ctr">
+                      <a:solidFill>
+                        <a:schemeClr val="tx1"/>
+                      </a:solidFill>
+                      <a:prstDash val="solid"/>
+                      <a:round/>
+                      <a:headEnd type="none" w="med" len="med"/>
+                      <a:tailEnd type="none" w="med" len="med"/>
+                    </a:lnR>
+                    <a:lnT w="12700" cap="flat" cmpd="sng" algn="ctr">
+                      <a:solidFill>
+                        <a:schemeClr val="tx1"/>
+                      </a:solidFill>
+                      <a:prstDash val="solid"/>
+                      <a:round/>
+                      <a:headEnd type="none" w="med" len="med"/>
+                      <a:tailEnd type="none" w="med" len="med"/>
+                    </a:lnT>
+                    <a:lnB w="12700" cap="flat" cmpd="sng" algn="ctr">
+                      <a:solidFill>
+                        <a:schemeClr val="tx1"/>
+                      </a:solidFill>
+                      <a:prstDash val="solid"/>
+                      <a:round/>
+                      <a:headEnd type="none" w="med" len="med"/>
+                      <a:tailEnd type="none" w="med" len="med"/>
+                    </a:lnB>
+                    <a:lnTlToBr w="12700" cmpd="sng">
+                      <a:noFill/>
+                      <a:prstDash val="solid"/>
+                    </a:lnTlToBr>
+                    <a:lnBlToTr w="12700" cmpd="sng">
+                      <a:noFill/>
+                      <a:prstDash val="solid"/>
+                    </a:lnBlToTr>
+                    <a:solidFill>
+                      <a:schemeClr val="bg1">
+                        <a:lumMod val="85000"/>
+                      </a:schemeClr>
+                    </a:solidFill>
+                  </a:tcPr>
+                </a:tc>
+                <a:tc>
+                  <a:txBody>
+                    <a:bodyPr/>
+                    <a:lstStyle/>
+                    <a:p>
+                      <a:pPr algn="ctr" fontAlgn="b"/>
+                      <a:r>
+                        <a:rPr lang="en-US" sz="1200" b="0" i="0" u="none" strike="noStrike" dirty="0" smtClean="0">
+                          <a:solidFill>
+                            <a:srgbClr val="000000"/>
+                          </a:solidFill>
+                          <a:effectLst/>
+                          <a:latin typeface="Calibri" panose="020F0502020204030204" pitchFamily="34" charset="0"/>
+                        </a:rPr>
+                        <a:t>Ranking (Top</a:t>
+                      </a:r>
+                      <a:r>
+                        <a:rPr lang="en-US" sz="1200" b="0" i="0" u="none" strike="noStrike" baseline="0" dirty="0" smtClean="0">
+                          <a:solidFill>
+                            <a:srgbClr val="000000"/>
+                          </a:solidFill>
+                          <a:effectLst/>
+                          <a:latin typeface="Calibri" panose="020F0502020204030204" pitchFamily="34" charset="0"/>
+                        </a:rPr>
+                        <a:t> in group</a:t>
+                      </a:r>
+                      <a:r>
+                        <a:rPr lang="en-US" sz="1200" b="0" i="0" u="none" strike="noStrike" dirty="0" smtClean="0">
+                          <a:solidFill>
+                            <a:srgbClr val="000000"/>
+                          </a:solidFill>
+                          <a:effectLst/>
+                          <a:latin typeface="Calibri" panose="020F0502020204030204" pitchFamily="34" charset="0"/>
+                        </a:rPr>
+                        <a:t>)</a:t>
+                      </a:r>
+                      <a:endParaRPr lang="en-US" sz="1200" b="0" i="0" u="none" strike="noStrike" dirty="0">
+                        <a:solidFill>
+                          <a:srgbClr val="000000"/>
+                        </a:solidFill>
+                        <a:effectLst/>
+                        <a:latin typeface="Calibri" panose="020F0502020204030204" pitchFamily="34" charset="0"/>
+                      </a:endParaRPr>
+                    </a:p>
+                  </a:txBody>
+                  <a:tcPr marL="9525" marR="9525" marT="9525" marB="0" anchor="b">
+                    <a:lnL w="12700" cap="flat" cmpd="sng" algn="ctr">
+                      <a:solidFill>
+                        <a:schemeClr val="tx1"/>
+                      </a:solidFill>
+                      <a:prstDash val="solid"/>
+                      <a:round/>
+                      <a:headEnd type="none" w="med" len="med"/>
+                      <a:tailEnd type="none" w="med" len="med"/>
+                    </a:lnL>
+                    <a:lnR w="12700" cap="flat" cmpd="sng" algn="ctr">
+                      <a:solidFill>
+                        <a:schemeClr val="tx1"/>
+                      </a:solidFill>
+                      <a:prstDash val="solid"/>
+                      <a:round/>
+                      <a:headEnd type="none" w="med" len="med"/>
+                      <a:tailEnd type="none" w="med" len="med"/>
+                    </a:lnR>
+                    <a:lnT w="12700" cap="flat" cmpd="sng" algn="ctr">
+                      <a:solidFill>
+                        <a:schemeClr val="tx1"/>
+                      </a:solidFill>
+                      <a:prstDash val="solid"/>
+                      <a:round/>
+                      <a:headEnd type="none" w="med" len="med"/>
+                      <a:tailEnd type="none" w="med" len="med"/>
+                    </a:lnT>
+                    <a:lnB w="12700" cap="flat" cmpd="sng" algn="ctr">
+                      <a:solidFill>
+                        <a:schemeClr val="tx1"/>
+                      </a:solidFill>
+                      <a:prstDash val="solid"/>
+                      <a:round/>
+                      <a:headEnd type="none" w="med" len="med"/>
+                      <a:tailEnd type="none" w="med" len="med"/>
+                    </a:lnB>
+                    <a:lnTlToBr w="12700" cmpd="sng">
+                      <a:noFill/>
+                      <a:prstDash val="solid"/>
+                    </a:lnTlToBr>
+                    <a:lnBlToTr w="12700" cmpd="sng">
+                      <a:noFill/>
+                      <a:prstDash val="solid"/>
+                    </a:lnBlToTr>
+                    <a:solidFill>
+                      <a:schemeClr val="bg1">
+                        <a:lumMod val="85000"/>
+                      </a:schemeClr>
+                    </a:solidFill>
+                  </a:tcPr>
+                </a:tc>
+                <a:tc>
+                  <a:txBody>
+                    <a:bodyPr/>
+                    <a:lstStyle/>
+                    <a:p>
+                      <a:pPr algn="r" fontAlgn="b"/>
+                      <a:r>
+                        <a:rPr lang="en-US" sz="1200" b="0" i="0" u="none" strike="noStrike" dirty="0" err="1" smtClean="0">
+                          <a:solidFill>
+                            <a:srgbClr val="000000"/>
+                          </a:solidFill>
+                          <a:effectLst/>
+                          <a:latin typeface="Calibri" panose="020F0502020204030204" pitchFamily="34" charset="0"/>
+                        </a:rPr>
+                        <a:t>SkillGroup</a:t>
+                      </a:r>
+                      <a:r>
+                        <a:rPr lang="en-US" sz="1200" b="0" i="0" u="none" strike="noStrike" baseline="0" dirty="0" smtClean="0">
+                          <a:solidFill>
+                            <a:srgbClr val="000000"/>
+                          </a:solidFill>
+                          <a:effectLst/>
+                          <a:latin typeface="Calibri" panose="020F0502020204030204" pitchFamily="34" charset="0"/>
+                        </a:rPr>
+                        <a:t> ID</a:t>
+                      </a:r>
+                      <a:endParaRPr lang="en-US" sz="1200" b="0" i="0" u="none" strike="noStrike" dirty="0">
+                        <a:solidFill>
+                          <a:srgbClr val="000000"/>
+                        </a:solidFill>
+                        <a:effectLst/>
+                        <a:latin typeface="Calibri" panose="020F0502020204030204" pitchFamily="34" charset="0"/>
+                      </a:endParaRPr>
+                    </a:p>
+                  </a:txBody>
+                  <a:tcPr marL="9525" marR="9525" marT="9525" marB="0" anchor="b">
+                    <a:lnL w="12700" cap="flat" cmpd="sng" algn="ctr">
+                      <a:solidFill>
+                        <a:schemeClr val="tx1"/>
+                      </a:solidFill>
+                      <a:prstDash val="solid"/>
+                      <a:round/>
+                      <a:headEnd type="none" w="med" len="med"/>
+                      <a:tailEnd type="none" w="med" len="med"/>
+                    </a:lnL>
+                    <a:lnR w="12700" cap="flat" cmpd="sng" algn="ctr">
+                      <a:solidFill>
+                        <a:schemeClr val="tx1"/>
+                      </a:solidFill>
+                      <a:prstDash val="solid"/>
+                      <a:round/>
+                      <a:headEnd type="none" w="med" len="med"/>
+                      <a:tailEnd type="none" w="med" len="med"/>
+                    </a:lnR>
+                    <a:lnT w="12700" cap="flat" cmpd="sng" algn="ctr">
+                      <a:solidFill>
+                        <a:schemeClr val="tx1"/>
+                      </a:solidFill>
+                      <a:prstDash val="solid"/>
+                      <a:round/>
+                      <a:headEnd type="none" w="med" len="med"/>
+                      <a:tailEnd type="none" w="med" len="med"/>
+                    </a:lnT>
+                    <a:lnB w="12700" cap="flat" cmpd="sng" algn="ctr">
+                      <a:solidFill>
+                        <a:schemeClr val="tx1"/>
+                      </a:solidFill>
+                      <a:prstDash val="solid"/>
+                      <a:round/>
+                      <a:headEnd type="none" w="med" len="med"/>
+                      <a:tailEnd type="none" w="med" len="med"/>
+                    </a:lnB>
+                    <a:lnTlToBr w="12700" cmpd="sng">
+                      <a:noFill/>
+                      <a:prstDash val="solid"/>
+                    </a:lnTlToBr>
+                    <a:lnBlToTr w="12700" cmpd="sng">
+                      <a:noFill/>
+                      <a:prstDash val="solid"/>
+                    </a:lnBlToTr>
+                    <a:solidFill>
+                      <a:schemeClr val="bg1">
+                        <a:lumMod val="85000"/>
+                      </a:schemeClr>
+                    </a:solidFill>
+                  </a:tcPr>
+                </a:tc>
+              </a:tr>
+              <a:tr h="0">
+                <a:tc>
+                  <a:txBody>
+                    <a:bodyPr/>
+                    <a:lstStyle/>
+                    <a:p>
+                      <a:pPr algn="ctr" fontAlgn="b"/>
+                      <a:r>
+                        <a:rPr lang="en-US" sz="1200" b="0" i="0" u="none" strike="noStrike" dirty="0" smtClean="0">
+                          <a:solidFill>
+                            <a:srgbClr val="000000"/>
+                          </a:solidFill>
+                          <a:effectLst/>
+                          <a:latin typeface="Calibri" panose="020F0502020204030204" pitchFamily="34" charset="0"/>
+                        </a:rPr>
+                        <a:t>3957x</a:t>
+                      </a:r>
+                      <a:endParaRPr lang="en-US" sz="1200" b="0" i="0" u="none" strike="noStrike" dirty="0">
+                        <a:solidFill>
+                          <a:srgbClr val="000000"/>
+                        </a:solidFill>
+                        <a:effectLst/>
+                        <a:latin typeface="Calibri" panose="020F0502020204030204" pitchFamily="34" charset="0"/>
+                      </a:endParaRPr>
+                    </a:p>
+                  </a:txBody>
+                  <a:tcPr marL="9525" marR="9525" marT="9525" marB="0" anchor="b">
+                    <a:lnL w="12700" cap="flat" cmpd="sng" algn="ctr">
+                      <a:solidFill>
+                        <a:schemeClr val="tx1"/>
+                      </a:solidFill>
+                      <a:prstDash val="solid"/>
+                      <a:round/>
+                      <a:headEnd type="none" w="med" len="med"/>
+                      <a:tailEnd type="none" w="med" len="med"/>
+                    </a:lnL>
+                    <a:lnR w="12700" cap="flat" cmpd="sng" algn="ctr">
+                      <a:solidFill>
+                        <a:schemeClr val="tx1"/>
+                      </a:solidFill>
+                      <a:prstDash val="solid"/>
+                      <a:round/>
+                      <a:headEnd type="none" w="med" len="med"/>
+                      <a:tailEnd type="none" w="med" len="med"/>
+                    </a:lnR>
+                    <a:lnT w="12700" cap="flat" cmpd="sng" algn="ctr">
+                      <a:solidFill>
+                        <a:schemeClr val="tx1"/>
+                      </a:solidFill>
+                      <a:prstDash val="solid"/>
+                      <a:round/>
+                      <a:headEnd type="none" w="med" len="med"/>
+                      <a:tailEnd type="none" w="med" len="med"/>
+                    </a:lnT>
+                    <a:lnB w="12700" cap="flat" cmpd="sng" algn="ctr">
+                      <a:solidFill>
+                        <a:schemeClr val="tx1"/>
+                      </a:solidFill>
+                      <a:prstDash val="solid"/>
+                      <a:round/>
+                      <a:headEnd type="none" w="med" len="med"/>
+                      <a:tailEnd type="none" w="med" len="med"/>
+                    </a:lnB>
+                  </a:tcPr>
+                </a:tc>
+                <a:tc>
+                  <a:txBody>
+                    <a:bodyPr/>
+                    <a:lstStyle/>
+                    <a:p>
+                      <a:pPr algn="ctr" fontAlgn="b"/>
+                      <a:r>
+                        <a:rPr lang="en-US" sz="1200" b="0" i="0" u="none" strike="noStrike" dirty="0" smtClean="0">
+                          <a:solidFill>
+                            <a:srgbClr val="000000"/>
+                          </a:solidFill>
+                          <a:effectLst/>
+                          <a:latin typeface="Calibri" panose="020F0502020204030204" pitchFamily="34" charset="0"/>
+                        </a:rPr>
+                        <a:t>certified</a:t>
+                      </a:r>
+                      <a:endParaRPr lang="en-US" sz="1200" b="0" i="0" u="none" strike="noStrike" dirty="0">
+                        <a:solidFill>
+                          <a:srgbClr val="000000"/>
+                        </a:solidFill>
+                        <a:effectLst/>
+                        <a:latin typeface="Calibri" panose="020F0502020204030204" pitchFamily="34" charset="0"/>
+                      </a:endParaRPr>
+                    </a:p>
+                  </a:txBody>
+                  <a:tcPr marL="9525" marR="9525" marT="9525" marB="0" anchor="b">
+                    <a:lnL w="12700" cap="flat" cmpd="sng" algn="ctr">
+                      <a:solidFill>
+                        <a:schemeClr val="tx1"/>
+                      </a:solidFill>
+                      <a:prstDash val="solid"/>
+                      <a:round/>
+                      <a:headEnd type="none" w="med" len="med"/>
+                      <a:tailEnd type="none" w="med" len="med"/>
+                    </a:lnL>
+                    <a:lnR w="12700" cap="flat" cmpd="sng" algn="ctr">
+                      <a:solidFill>
+                        <a:schemeClr val="tx1"/>
+                      </a:solidFill>
+                      <a:prstDash val="solid"/>
+                      <a:round/>
+                      <a:headEnd type="none" w="med" len="med"/>
+                      <a:tailEnd type="none" w="med" len="med"/>
+                    </a:lnR>
+                    <a:lnT w="12700" cap="flat" cmpd="sng" algn="ctr">
+                      <a:solidFill>
+                        <a:schemeClr val="tx1"/>
+                      </a:solidFill>
+                      <a:prstDash val="solid"/>
+                      <a:round/>
+                      <a:headEnd type="none" w="med" len="med"/>
+                      <a:tailEnd type="none" w="med" len="med"/>
+                    </a:lnT>
+                    <a:lnB w="12700" cap="flat" cmpd="sng" algn="ctr">
+                      <a:solidFill>
+                        <a:schemeClr val="tx1"/>
+                      </a:solidFill>
+                      <a:prstDash val="solid"/>
+                      <a:round/>
+                      <a:headEnd type="none" w="med" len="med"/>
+                      <a:tailEnd type="none" w="med" len="med"/>
+                    </a:lnB>
+                  </a:tcPr>
+                </a:tc>
+                <a:tc>
+                  <a:txBody>
+                    <a:bodyPr/>
+                    <a:lstStyle/>
+                    <a:p>
+                      <a:pPr algn="ctr" fontAlgn="b"/>
+                      <a:r>
+                        <a:rPr lang="en-US" sz="1200" b="0" i="0" u="none" strike="noStrike" dirty="0" smtClean="0">
+                          <a:solidFill>
+                            <a:srgbClr val="000000"/>
+                          </a:solidFill>
+                          <a:effectLst/>
+                          <a:latin typeface="Calibri" panose="020F0502020204030204" pitchFamily="34" charset="0"/>
+                        </a:rPr>
+                        <a:t>108</a:t>
+                      </a:r>
+                      <a:endParaRPr lang="en-US" sz="1200" b="0" i="0" u="none" strike="noStrike" dirty="0">
+                        <a:solidFill>
+                          <a:srgbClr val="000000"/>
+                        </a:solidFill>
+                        <a:effectLst/>
+                        <a:latin typeface="Calibri" panose="020F0502020204030204" pitchFamily="34" charset="0"/>
+                      </a:endParaRPr>
+                    </a:p>
+                  </a:txBody>
+                  <a:tcPr marL="9525" marR="9525" marT="9525" marB="0" anchor="b">
+                    <a:lnL w="12700" cap="flat" cmpd="sng" algn="ctr">
+                      <a:solidFill>
+                        <a:schemeClr val="tx1"/>
+                      </a:solidFill>
+                      <a:prstDash val="solid"/>
+                      <a:round/>
+                      <a:headEnd type="none" w="med" len="med"/>
+                      <a:tailEnd type="none" w="med" len="med"/>
+                    </a:lnL>
+                    <a:lnR w="12700" cap="flat" cmpd="sng" algn="ctr">
+                      <a:solidFill>
+                        <a:schemeClr val="tx1"/>
+                      </a:solidFill>
+                      <a:prstDash val="solid"/>
+                      <a:round/>
+                      <a:headEnd type="none" w="med" len="med"/>
+                      <a:tailEnd type="none" w="med" len="med"/>
+                    </a:lnR>
+                    <a:lnT w="12700" cap="flat" cmpd="sng" algn="ctr">
+                      <a:solidFill>
+                        <a:schemeClr val="tx1"/>
+                      </a:solidFill>
+                      <a:prstDash val="solid"/>
+                      <a:round/>
+                      <a:headEnd type="none" w="med" len="med"/>
+                      <a:tailEnd type="none" w="med" len="med"/>
+                    </a:lnT>
+                    <a:lnB w="12700" cap="flat" cmpd="sng" algn="ctr">
+                      <a:solidFill>
+                        <a:schemeClr val="tx1"/>
+                      </a:solidFill>
+                      <a:prstDash val="solid"/>
+                      <a:round/>
+                      <a:headEnd type="none" w="med" len="med"/>
+                      <a:tailEnd type="none" w="med" len="med"/>
+                    </a:lnB>
+                  </a:tcPr>
+                </a:tc>
+                <a:tc>
+                  <a:txBody>
+                    <a:bodyPr/>
+                    <a:lstStyle/>
+                    <a:p>
+                      <a:pPr algn="ctr" fontAlgn="b"/>
+                      <a:r>
+                        <a:rPr lang="en-US" sz="1200" b="0" i="0" u="none" strike="noStrike" baseline="0" dirty="0" smtClean="0">
+                          <a:solidFill>
+                            <a:srgbClr val="000000"/>
+                          </a:solidFill>
+                          <a:effectLst/>
+                          <a:latin typeface="Calibri" panose="020F0502020204030204" pitchFamily="34" charset="0"/>
+                        </a:rPr>
+                        <a:t>10</a:t>
+                      </a:r>
+                      <a:endParaRPr lang="en-US" sz="1200" b="0" i="0" u="none" strike="noStrike" dirty="0">
+                        <a:solidFill>
+                          <a:srgbClr val="000000"/>
+                        </a:solidFill>
+                        <a:effectLst/>
+                        <a:latin typeface="Calibri" panose="020F0502020204030204" pitchFamily="34" charset="0"/>
+                      </a:endParaRPr>
+                    </a:p>
+                  </a:txBody>
+                  <a:tcPr marL="9525" marR="9525" marT="9525" marB="0" anchor="b">
+                    <a:lnL w="12700" cap="flat" cmpd="sng" algn="ctr">
+                      <a:solidFill>
+                        <a:schemeClr val="tx1"/>
+                      </a:solidFill>
+                      <a:prstDash val="solid"/>
+                      <a:round/>
+                      <a:headEnd type="none" w="med" len="med"/>
+                      <a:tailEnd type="none" w="med" len="med"/>
+                    </a:lnL>
+                    <a:lnR w="12700" cap="flat" cmpd="sng" algn="ctr">
+                      <a:solidFill>
+                        <a:schemeClr val="tx1"/>
+                      </a:solidFill>
+                      <a:prstDash val="solid"/>
+                      <a:round/>
+                      <a:headEnd type="none" w="med" len="med"/>
+                      <a:tailEnd type="none" w="med" len="med"/>
+                    </a:lnR>
+                    <a:lnT w="12700" cap="flat" cmpd="sng" algn="ctr">
+                      <a:solidFill>
+                        <a:schemeClr val="tx1"/>
+                      </a:solidFill>
+                      <a:prstDash val="solid"/>
+                      <a:round/>
+                      <a:headEnd type="none" w="med" len="med"/>
+                      <a:tailEnd type="none" w="med" len="med"/>
+                    </a:lnT>
+                    <a:lnB w="12700" cap="flat" cmpd="sng" algn="ctr">
+                      <a:solidFill>
+                        <a:schemeClr val="tx1"/>
+                      </a:solidFill>
+                      <a:prstDash val="solid"/>
+                      <a:round/>
+                      <a:headEnd type="none" w="med" len="med"/>
+                      <a:tailEnd type="none" w="med" len="med"/>
+                    </a:lnB>
+                  </a:tcPr>
+                </a:tc>
+              </a:tr>
+            </a:tbl>
+          </a:graphicData>
+        </a:graphic>
+      </p:graphicFrame>
+      <p:pic>
+        <p:nvPicPr>
+          <p:cNvPr id="4" name="Picture 3"/>
+          <p:cNvPicPr>
+            <a:picLocks noChangeAspect="1"/>
+          </p:cNvPicPr>
+          <p:nvPr/>
+        </p:nvPicPr>
+        <p:blipFill>
+          <a:blip r:embed="rId8"/>
+          <a:stretch>
+            <a:fillRect/>
+          </a:stretch>
+        </p:blipFill>
+        <p:spPr>
+          <a:xfrm>
+            <a:off x="1389062" y="3172967"/>
+            <a:ext cx="2790825" cy="314325"/>
+          </a:xfrm>
+          <a:prstGeom prst="rect">
+            <a:avLst/>
+          </a:prstGeom>
+          <a:ln w="9525" cap="sq">
+            <a:solidFill>
+              <a:srgbClr val="000000"/>
+            </a:solidFill>
+            <a:miter lim="800000"/>
+          </a:ln>
+          <a:effectLst>
+            <a:outerShdw blurRad="57150" dist="50800" dir="2700000" algn="tl" rotWithShape="0">
+              <a:srgbClr val="000000">
+                <a:alpha val="40000"/>
+              </a:srgbClr>
+            </a:outerShdw>
+          </a:effectLst>
+        </p:spPr>
+      </p:pic>
     </p:spTree>
     <p:extLst>
       <p:ext uri="{BB962C8B-B14F-4D97-AF65-F5344CB8AC3E}">
@@ -29128,7 +29825,7 @@
                     <a:p>
                       <a:pPr algn="l" fontAlgn="b"/>
                       <a:r>
-                        <a:rPr lang="en-US" sz="1100" b="0" i="0" u="none" strike="noStrike">
+                        <a:rPr lang="en-US" sz="1100" b="0" i="0" u="none" strike="noStrike" dirty="0">
                           <a:solidFill>
                             <a:srgbClr val="000000"/>
                           </a:solidFill>
@@ -42207,8 +42904,8 @@
         </p:nvSpPr>
         <p:spPr>
           <a:xfrm>
-            <a:off x="1974448" y="2224737"/>
-            <a:ext cx="2296398" cy="307777"/>
+            <a:off x="3773327" y="3163653"/>
+            <a:ext cx="1979003" cy="307777"/>
           </a:xfrm>
           <a:prstGeom prst="rect">
             <a:avLst/>
@@ -42222,7 +42919,11 @@
           <a:p>
             <a:r>
               <a:rPr lang="en-US" sz="1400" dirty="0" smtClean="0"/>
-              <a:t>skills removed from its group</a:t>
+              <a:t>removed </a:t>
+            </a:r>
+            <a:r>
+              <a:rPr lang="en-US" sz="1400" dirty="0" smtClean="0"/>
+              <a:t>from its group</a:t>
             </a:r>
             <a:endParaRPr lang="en-US" sz="1400" dirty="0"/>
           </a:p>

</xml_diff>